<commit_message>
fixed definition of regexp methods
</commit_message>
<xml_diff>
--- a/slides/klasse9.pptx
+++ b/slides/klasse9.pptx
@@ -126,11 +126,7 @@
 <file path=ppt/commentAuthors.xml><?xml version="1.0" encoding="utf-8"?>
 <p:cmAuthorLst xmlns:a="http://schemas.openxmlformats.org/drawingml/2006/main" xmlns:r="http://schemas.openxmlformats.org/officeDocument/2006/relationships" xmlns:p="http://schemas.openxmlformats.org/presentationml/2006/main">
   <p:cmAuthor id="1" name="Abarca Bayona, Carlos" initials="ABC" lastIdx="1" clrIdx="0">
-    <p:extLst>
-      <p:ext uri="{19B8F6BF-5375-455C-9EA6-DF929625EA0E}">
-        <p15:presenceInfo xmlns:p15="http://schemas.microsoft.com/office/powerpoint/2012/main" userId="" providerId=""/>
-      </p:ext>
-    </p:extLst>
+    <p:extLst/>
   </p:cmAuthor>
 </p:cmAuthorLst>
 </file>
@@ -6258,15 +6254,7 @@
             </a:r>
             <a:r>
               <a:rPr lang="en-US" dirty="0" smtClean="0"/>
-              <a:t> are fundamentally a programming language </a:t>
-            </a:r>
-            <a:r>
-              <a:rPr lang="en-US" dirty="0" smtClean="0"/>
-              <a:t>on their </a:t>
-            </a:r>
-            <a:r>
-              <a:rPr lang="en-US" dirty="0" smtClean="0"/>
-              <a:t>own. </a:t>
+              <a:t> are fundamentally a programming language on their own. </a:t>
             </a:r>
           </a:p>
           <a:p>
@@ -6717,12 +6705,8 @@
           <a:lstStyle/>
           <a:p>
             <a:r>
-              <a:rPr lang="en-US" i="1" dirty="0" err="1"/>
-              <a:t>b</a:t>
-            </a:r>
-            <a:r>
               <a:rPr lang="en-US" i="1" dirty="0" err="1" smtClean="0"/>
-              <a:t>ool</a:t>
+              <a:t>matchObj</a:t>
             </a:r>
             <a:r>
               <a:rPr lang="en-US" dirty="0" smtClean="0"/>
@@ -6742,21 +6726,16 @@
             </a:r>
             <a:r>
               <a:rPr lang="en-US" dirty="0" smtClean="0"/>
-              <a:t>, </a:t>
+              <a:t>, source, flags=0)</a:t>
+            </a:r>
+          </a:p>
+          <a:p>
+            <a:r>
+              <a:rPr lang="en-US" i="1" dirty="0" err="1"/>
+              <a:t>matchObj</a:t>
             </a:r>
             <a:r>
               <a:rPr lang="en-US" dirty="0" smtClean="0"/>
-              <a:t>source, flags=0)</a:t>
-            </a:r>
-            <a:endParaRPr lang="en-US" dirty="0" smtClean="0"/>
-          </a:p>
-          <a:p>
-            <a:r>
-              <a:rPr lang="en-US" i="1" dirty="0" err="1"/>
-              <a:t>bool</a:t>
-            </a:r>
-            <a:r>
-              <a:rPr lang="en-US" dirty="0"/>
               <a:t> </a:t>
             </a:r>
             <a:r>
@@ -6859,7 +6838,6 @@
               <a:rPr lang="en-US" dirty="0" smtClean="0"/>
               <a:t>(pattern, flags=0) </a:t>
             </a:r>
-            <a:endParaRPr lang="en-US" dirty="0" smtClean="0"/>
           </a:p>
           <a:p>
             <a:endParaRPr lang="en-US" i="1" dirty="0"/>

</xml_diff>